<commit_message>
reorganise images and use vector graphics
</commit_message>
<xml_diff>
--- a/writing/figures_thesis/figures_all.pptx
+++ b/writing/figures_thesis/figures_all.pptx
@@ -6411,7 +6411,7 @@
         </p:blipFill>
         <p:spPr>
           <a:xfrm>
-            <a:off x="4446872" y="442916"/>
+            <a:off x="4531164" y="3621670"/>
             <a:ext cx="3337298" cy="3192568"/>
           </a:xfrm>
           <a:prstGeom prst="rect">
@@ -6441,7 +6441,7 @@
         </p:blipFill>
         <p:spPr>
           <a:xfrm>
-            <a:off x="4599272" y="3635484"/>
+            <a:off x="4667380" y="380958"/>
             <a:ext cx="3201082" cy="3192568"/>
           </a:xfrm>
           <a:prstGeom prst="rect">

</xml_diff>